<commit_message>
some edits to slide 12
</commit_message>
<xml_diff>
--- a/R-Jupyter-Notebook_Setup.pptx
+++ b/R-Jupyter-Notebook_Setup.pptx
@@ -296,7 +296,7 @@
           <a:p>
             <a:fld id="{94F1D196-9844-E644-8F8C-BE649BA2ECC2}" type="datetimeFigureOut">
               <a:rPr lang="en-US" smtClean="0"/>
-              <a:t>8/28/21</a:t>
+              <a:t>8/29/21</a:t>
             </a:fld>
             <a:endParaRPr lang="en-US"/>
           </a:p>
@@ -494,7 +494,7 @@
           <a:p>
             <a:fld id="{94F1D196-9844-E644-8F8C-BE649BA2ECC2}" type="datetimeFigureOut">
               <a:rPr lang="en-US" smtClean="0"/>
-              <a:t>8/28/21</a:t>
+              <a:t>8/29/21</a:t>
             </a:fld>
             <a:endParaRPr lang="en-US"/>
           </a:p>
@@ -702,7 +702,7 @@
           <a:p>
             <a:fld id="{94F1D196-9844-E644-8F8C-BE649BA2ECC2}" type="datetimeFigureOut">
               <a:rPr lang="en-US" smtClean="0"/>
-              <a:t>8/28/21</a:t>
+              <a:t>8/29/21</a:t>
             </a:fld>
             <a:endParaRPr lang="en-US"/>
           </a:p>
@@ -900,7 +900,7 @@
           <a:p>
             <a:fld id="{94F1D196-9844-E644-8F8C-BE649BA2ECC2}" type="datetimeFigureOut">
               <a:rPr lang="en-US" smtClean="0"/>
-              <a:t>8/28/21</a:t>
+              <a:t>8/29/21</a:t>
             </a:fld>
             <a:endParaRPr lang="en-US"/>
           </a:p>
@@ -1175,7 +1175,7 @@
           <a:p>
             <a:fld id="{94F1D196-9844-E644-8F8C-BE649BA2ECC2}" type="datetimeFigureOut">
               <a:rPr lang="en-US" smtClean="0"/>
-              <a:t>8/28/21</a:t>
+              <a:t>8/29/21</a:t>
             </a:fld>
             <a:endParaRPr lang="en-US"/>
           </a:p>
@@ -1440,7 +1440,7 @@
           <a:p>
             <a:fld id="{94F1D196-9844-E644-8F8C-BE649BA2ECC2}" type="datetimeFigureOut">
               <a:rPr lang="en-US" smtClean="0"/>
-              <a:t>8/28/21</a:t>
+              <a:t>8/29/21</a:t>
             </a:fld>
             <a:endParaRPr lang="en-US"/>
           </a:p>
@@ -1852,7 +1852,7 @@
           <a:p>
             <a:fld id="{94F1D196-9844-E644-8F8C-BE649BA2ECC2}" type="datetimeFigureOut">
               <a:rPr lang="en-US" smtClean="0"/>
-              <a:t>8/28/21</a:t>
+              <a:t>8/29/21</a:t>
             </a:fld>
             <a:endParaRPr lang="en-US"/>
           </a:p>
@@ -1993,7 +1993,7 @@
           <a:p>
             <a:fld id="{94F1D196-9844-E644-8F8C-BE649BA2ECC2}" type="datetimeFigureOut">
               <a:rPr lang="en-US" smtClean="0"/>
-              <a:t>8/28/21</a:t>
+              <a:t>8/29/21</a:t>
             </a:fld>
             <a:endParaRPr lang="en-US"/>
           </a:p>
@@ -2106,7 +2106,7 @@
           <a:p>
             <a:fld id="{94F1D196-9844-E644-8F8C-BE649BA2ECC2}" type="datetimeFigureOut">
               <a:rPr lang="en-US" smtClean="0"/>
-              <a:t>8/28/21</a:t>
+              <a:t>8/29/21</a:t>
             </a:fld>
             <a:endParaRPr lang="en-US"/>
           </a:p>
@@ -2417,7 +2417,7 @@
           <a:p>
             <a:fld id="{94F1D196-9844-E644-8F8C-BE649BA2ECC2}" type="datetimeFigureOut">
               <a:rPr lang="en-US" smtClean="0"/>
-              <a:t>8/28/21</a:t>
+              <a:t>8/29/21</a:t>
             </a:fld>
             <a:endParaRPr lang="en-US"/>
           </a:p>
@@ -2705,7 +2705,7 @@
           <a:p>
             <a:fld id="{94F1D196-9844-E644-8F8C-BE649BA2ECC2}" type="datetimeFigureOut">
               <a:rPr lang="en-US" smtClean="0"/>
-              <a:t>8/28/21</a:t>
+              <a:t>8/29/21</a:t>
             </a:fld>
             <a:endParaRPr lang="en-US"/>
           </a:p>
@@ -2946,7 +2946,7 @@
           <a:p>
             <a:fld id="{94F1D196-9844-E644-8F8C-BE649BA2ECC2}" type="datetimeFigureOut">
               <a:rPr lang="en-US" smtClean="0"/>
-              <a:t>8/28/21</a:t>
+              <a:t>8/29/21</a:t>
             </a:fld>
             <a:endParaRPr lang="en-US"/>
           </a:p>
@@ -4615,7 +4615,15 @@
           <a:p>
             <a:r>
               <a:rPr lang="en-US" dirty="0"/>
-              <a:t>There are more than thousands of R packages</a:t>
+              <a:t>There </a:t>
+            </a:r>
+            <a:r>
+              <a:rPr lang="en-US"/>
+              <a:t>are thousands </a:t>
+            </a:r>
+            <a:r>
+              <a:rPr lang="en-US" dirty="0"/>
+              <a:t>of R packages</a:t>
             </a:r>
           </a:p>
           <a:p>

</xml_diff>